<commit_message>
Edited Developer Guide - added Appendix B and change of class diagram
</commit_message>
<xml_diff>
--- a/docs/Diagrams.pptx
+++ b/docs/Diagrams.pptx
@@ -211,7 +211,7 @@
           <a:p>
             <a:fld id="{F5CC4B3F-88C1-4FFA-B1B6-F41C21DC6924}" type="datetimeFigureOut">
               <a:rPr lang="en-US" smtClean="0"/>
-              <a:t>8/12/2018</a:t>
+              <a:t>9/20/2018</a:t>
             </a:fld>
             <a:endParaRPr lang="en-US"/>
           </a:p>
@@ -741,7 +741,7 @@
           <a:p>
             <a:fld id="{78C97017-6FC3-485B-9764-EAC9E56C1D49}" type="datetimeFigureOut">
               <a:rPr lang="en-US" smtClean="0"/>
-              <a:t>8/12/2018</a:t>
+              <a:t>9/20/2018</a:t>
             </a:fld>
             <a:endParaRPr lang="en-US"/>
           </a:p>
@@ -909,7 +909,7 @@
           <a:p>
             <a:fld id="{78C97017-6FC3-485B-9764-EAC9E56C1D49}" type="datetimeFigureOut">
               <a:rPr lang="en-US" smtClean="0"/>
-              <a:t>8/12/2018</a:t>
+              <a:t>9/20/2018</a:t>
             </a:fld>
             <a:endParaRPr lang="en-US"/>
           </a:p>
@@ -1087,7 +1087,7 @@
           <a:p>
             <a:fld id="{78C97017-6FC3-485B-9764-EAC9E56C1D49}" type="datetimeFigureOut">
               <a:rPr lang="en-US" smtClean="0"/>
-              <a:t>8/12/2018</a:t>
+              <a:t>9/20/2018</a:t>
             </a:fld>
             <a:endParaRPr lang="en-US"/>
           </a:p>
@@ -1255,7 +1255,7 @@
           <a:p>
             <a:fld id="{78C97017-6FC3-485B-9764-EAC9E56C1D49}" type="datetimeFigureOut">
               <a:rPr lang="en-US" smtClean="0"/>
-              <a:t>8/12/2018</a:t>
+              <a:t>9/20/2018</a:t>
             </a:fld>
             <a:endParaRPr lang="en-US"/>
           </a:p>
@@ -1500,7 +1500,7 @@
           <a:p>
             <a:fld id="{78C97017-6FC3-485B-9764-EAC9E56C1D49}" type="datetimeFigureOut">
               <a:rPr lang="en-US" smtClean="0"/>
-              <a:t>8/12/2018</a:t>
+              <a:t>9/20/2018</a:t>
             </a:fld>
             <a:endParaRPr lang="en-US"/>
           </a:p>
@@ -1785,7 +1785,7 @@
           <a:p>
             <a:fld id="{78C97017-6FC3-485B-9764-EAC9E56C1D49}" type="datetimeFigureOut">
               <a:rPr lang="en-US" smtClean="0"/>
-              <a:t>8/12/2018</a:t>
+              <a:t>9/20/2018</a:t>
             </a:fld>
             <a:endParaRPr lang="en-US"/>
           </a:p>
@@ -2204,7 +2204,7 @@
           <a:p>
             <a:fld id="{78C97017-6FC3-485B-9764-EAC9E56C1D49}" type="datetimeFigureOut">
               <a:rPr lang="en-US" smtClean="0"/>
-              <a:t>8/12/2018</a:t>
+              <a:t>9/20/2018</a:t>
             </a:fld>
             <a:endParaRPr lang="en-US"/>
           </a:p>
@@ -2321,7 +2321,7 @@
           <a:p>
             <a:fld id="{78C97017-6FC3-485B-9764-EAC9E56C1D49}" type="datetimeFigureOut">
               <a:rPr lang="en-US" smtClean="0"/>
-              <a:t>8/12/2018</a:t>
+              <a:t>9/20/2018</a:t>
             </a:fld>
             <a:endParaRPr lang="en-US"/>
           </a:p>
@@ -2416,7 +2416,7 @@
           <a:p>
             <a:fld id="{78C97017-6FC3-485B-9764-EAC9E56C1D49}" type="datetimeFigureOut">
               <a:rPr lang="en-US" smtClean="0"/>
-              <a:t>8/12/2018</a:t>
+              <a:t>9/20/2018</a:t>
             </a:fld>
             <a:endParaRPr lang="en-US"/>
           </a:p>
@@ -2691,7 +2691,7 @@
           <a:p>
             <a:fld id="{78C97017-6FC3-485B-9764-EAC9E56C1D49}" type="datetimeFigureOut">
               <a:rPr lang="en-US" smtClean="0"/>
-              <a:t>8/12/2018</a:t>
+              <a:t>9/20/2018</a:t>
             </a:fld>
             <a:endParaRPr lang="en-US"/>
           </a:p>
@@ -2943,7 +2943,7 @@
           <a:p>
             <a:fld id="{78C97017-6FC3-485B-9764-EAC9E56C1D49}" type="datetimeFigureOut">
               <a:rPr lang="en-US" smtClean="0"/>
-              <a:t>8/12/2018</a:t>
+              <a:t>9/20/2018</a:t>
             </a:fld>
             <a:endParaRPr lang="en-US"/>
           </a:p>
@@ -3154,7 +3154,7 @@
           <a:p>
             <a:fld id="{78C97017-6FC3-485B-9764-EAC9E56C1D49}" type="datetimeFigureOut">
               <a:rPr lang="en-US" smtClean="0"/>
-              <a:t>8/12/2018</a:t>
+              <a:t>9/20/2018</a:t>
             </a:fld>
             <a:endParaRPr lang="en-US"/>
           </a:p>
@@ -3612,6 +3612,55 @@
           <a:chExt cx="0" cy="0"/>
         </a:xfrm>
       </p:grpSpPr>
+      <p:cxnSp>
+        <p:nvCxnSpPr>
+          <p:cNvPr id="114" name="Elbow Connector 135">
+            <a:extLst>
+              <a:ext uri="{FF2B5EF4-FFF2-40B4-BE49-F238E27FC236}">
+                <a16:creationId xmlns:a16="http://schemas.microsoft.com/office/drawing/2014/main" id="{93C7F346-F928-49EC-9F0E-652A5CF8E8FF}"/>
+              </a:ext>
+            </a:extLst>
+          </p:cNvPr>
+          <p:cNvCxnSpPr>
+            <a:endCxn id="112" idx="3"/>
+          </p:cNvCxnSpPr>
+          <p:nvPr/>
+        </p:nvCxnSpPr>
+        <p:spPr>
+          <a:xfrm rot="5400000">
+            <a:off x="6978413" y="3401936"/>
+            <a:ext cx="253555" cy="2883"/>
+          </a:xfrm>
+          <a:prstGeom prst="bentConnector3">
+            <a:avLst>
+              <a:gd name="adj1" fmla="val 50000"/>
+            </a:avLst>
+          </a:prstGeom>
+          <a:ln w="19050">
+            <a:solidFill>
+              <a:srgbClr val="7030A0"/>
+            </a:solidFill>
+            <a:prstDash val="dash"/>
+            <a:headEnd type="none" w="med" len="med"/>
+            <a:tailEnd type="none" w="med" len="med"/>
+          </a:ln>
+          <a:effectLst/>
+        </p:spPr>
+        <p:style>
+          <a:lnRef idx="1">
+            <a:schemeClr val="accent6"/>
+          </a:lnRef>
+          <a:fillRef idx="2">
+            <a:schemeClr val="accent6"/>
+          </a:fillRef>
+          <a:effectRef idx="1">
+            <a:schemeClr val="accent6"/>
+          </a:effectRef>
+          <a:fontRef idx="minor">
+            <a:schemeClr val="dk1"/>
+          </a:fontRef>
+        </p:style>
+      </p:cxnSp>
       <p:sp>
         <p:nvSpPr>
           <p:cNvPr id="9" name="Rectangle 8"/>
@@ -3981,7 +4030,7 @@
             <a:pPr algn="ctr"/>
             <a:r>
               <a:rPr lang="en-US" sz="1050" dirty="0"/>
-              <a:t>Phone</a:t>
+              <a:t>Name</a:t>
             </a:r>
             <a:endParaRPr lang="en-SG" sz="1050" dirty="0"/>
           </a:p>
@@ -4025,7 +4074,7 @@
             <a:pPr algn="ctr"/>
             <a:r>
               <a:rPr lang="en-US" sz="1050" dirty="0"/>
-              <a:t>Email</a:t>
+              <a:t>NRIC</a:t>
             </a:r>
             <a:endParaRPr lang="en-SG" sz="1050" dirty="0"/>
           </a:p>
@@ -5554,7 +5603,7 @@
             <a:pPr algn="ctr"/>
             <a:r>
               <a:rPr lang="en-US" sz="1050" dirty="0"/>
-              <a:t>Name</a:t>
+              <a:t>Past Offences</a:t>
             </a:r>
             <a:endParaRPr lang="en-SG" sz="1050" dirty="0"/>
           </a:p>
@@ -6712,7 +6761,7 @@
             <a:pPr algn="ctr"/>
             <a:r>
               <a:rPr lang="en-US" sz="1050" dirty="0"/>
-              <a:t>Tag</a:t>
+              <a:t>Status</a:t>
             </a:r>
             <a:endParaRPr lang="en-SG" sz="1050" dirty="0"/>
           </a:p>
@@ -6733,6 +6782,470 @@
         <p:spPr>
           <a:xfrm>
             <a:off x="7945556" y="2928939"/>
+            <a:ext cx="88232" cy="369332"/>
+          </a:xfrm>
+          <a:prstGeom prst="rect">
+            <a:avLst/>
+          </a:prstGeom>
+          <a:noFill/>
+        </p:spPr>
+        <p:txBody>
+          <a:bodyPr wrap="square" rtlCol="0">
+            <a:spAutoFit/>
+          </a:bodyPr>
+          <a:lstStyle/>
+          <a:p>
+            <a:r>
+              <a:rPr lang="en-US" dirty="0">
+                <a:solidFill>
+                  <a:srgbClr val="7030A0"/>
+                </a:solidFill>
+              </a:rPr>
+              <a:t>*</a:t>
+            </a:r>
+          </a:p>
+        </p:txBody>
+      </p:sp>
+      <p:sp>
+        <p:nvSpPr>
+          <p:cNvPr id="74" name="Rectangle 73">
+            <a:extLst>
+              <a:ext uri="{FF2B5EF4-FFF2-40B4-BE49-F238E27FC236}">
+                <a16:creationId xmlns:a16="http://schemas.microsoft.com/office/drawing/2014/main" id="{D25AB4B6-2E13-4B4E-AE7E-F98A8BF1D462}"/>
+              </a:ext>
+            </a:extLst>
+          </p:cNvPr>
+          <p:cNvSpPr/>
+          <p:nvPr/>
+        </p:nvSpPr>
+        <p:spPr>
+          <a:xfrm>
+            <a:off x="6634824" y="3719171"/>
+            <a:ext cx="929296" cy="346760"/>
+          </a:xfrm>
+          <a:prstGeom prst="rect">
+            <a:avLst/>
+          </a:prstGeom>
+          <a:solidFill>
+            <a:schemeClr val="accent4">
+              <a:lumMod val="75000"/>
+            </a:schemeClr>
+          </a:solidFill>
+          <a:ln w="19050">
+            <a:solidFill>
+              <a:srgbClr val="7030A0"/>
+            </a:solidFill>
+          </a:ln>
+          <a:effectLst/>
+        </p:spPr>
+        <p:style>
+          <a:lnRef idx="1">
+            <a:schemeClr val="accent6"/>
+          </a:lnRef>
+          <a:fillRef idx="2">
+            <a:schemeClr val="accent6"/>
+          </a:fillRef>
+          <a:effectRef idx="1">
+            <a:schemeClr val="accent6"/>
+          </a:effectRef>
+          <a:fontRef idx="minor">
+            <a:schemeClr val="dk1"/>
+          </a:fontRef>
+        </p:style>
+        <p:txBody>
+          <a:bodyPr rtlCol="0" anchor="ctr"/>
+          <a:lstStyle/>
+          <a:p>
+            <a:pPr algn="ctr"/>
+            <a:r>
+              <a:rPr lang="en-US" sz="1050" dirty="0">
+                <a:solidFill>
+                  <a:schemeClr val="bg1"/>
+                </a:solidFill>
+              </a:rPr>
+              <a:t>Police Officer</a:t>
+            </a:r>
+            <a:endParaRPr lang="en-SG" sz="1050" dirty="0">
+              <a:solidFill>
+                <a:schemeClr val="bg1"/>
+              </a:solidFill>
+            </a:endParaRPr>
+          </a:p>
+        </p:txBody>
+      </p:sp>
+      <p:cxnSp>
+        <p:nvCxnSpPr>
+          <p:cNvPr id="78" name="Elbow Connector 72">
+            <a:extLst>
+              <a:ext uri="{FF2B5EF4-FFF2-40B4-BE49-F238E27FC236}">
+                <a16:creationId xmlns:a16="http://schemas.microsoft.com/office/drawing/2014/main" id="{16A2E046-8DF3-4B0C-96A2-FDDE18F42E91}"/>
+              </a:ext>
+            </a:extLst>
+          </p:cNvPr>
+          <p:cNvCxnSpPr>
+            <a:cxnSpLocks/>
+            <a:stCxn id="74" idx="2"/>
+            <a:endCxn id="19" idx="0"/>
+          </p:cNvCxnSpPr>
+          <p:nvPr/>
+        </p:nvCxnSpPr>
+        <p:spPr>
+          <a:xfrm rot="16200000" flipH="1">
+            <a:off x="6957537" y="4207866"/>
+            <a:ext cx="286754" cy="2884"/>
+          </a:xfrm>
+          <a:prstGeom prst="bentConnector3">
+            <a:avLst>
+              <a:gd name="adj1" fmla="val 50000"/>
+            </a:avLst>
+          </a:prstGeom>
+          <a:ln w="19050">
+            <a:solidFill>
+              <a:srgbClr val="7030A0"/>
+            </a:solidFill>
+            <a:prstDash val="dash"/>
+            <a:headEnd type="none" w="med" len="med"/>
+            <a:tailEnd type="arrow" w="med" len="med"/>
+          </a:ln>
+          <a:effectLst/>
+        </p:spPr>
+        <p:style>
+          <a:lnRef idx="1">
+            <a:schemeClr val="accent2"/>
+          </a:lnRef>
+          <a:fillRef idx="2">
+            <a:schemeClr val="accent2"/>
+          </a:fillRef>
+          <a:effectRef idx="1">
+            <a:schemeClr val="accent2"/>
+          </a:effectRef>
+          <a:fontRef idx="minor">
+            <a:schemeClr val="dk1"/>
+          </a:fontRef>
+        </p:style>
+      </p:cxnSp>
+      <p:cxnSp>
+        <p:nvCxnSpPr>
+          <p:cNvPr id="80" name="Elbow Connector 50">
+            <a:extLst>
+              <a:ext uri="{FF2B5EF4-FFF2-40B4-BE49-F238E27FC236}">
+                <a16:creationId xmlns:a16="http://schemas.microsoft.com/office/drawing/2014/main" id="{4F9137F4-4271-4989-B320-96363D919FB2}"/>
+              </a:ext>
+            </a:extLst>
+          </p:cNvPr>
+          <p:cNvCxnSpPr>
+            <a:cxnSpLocks/>
+          </p:cNvCxnSpPr>
+          <p:nvPr/>
+        </p:nvCxnSpPr>
+        <p:spPr>
+          <a:xfrm flipV="1">
+            <a:off x="4648200" y="3307690"/>
+            <a:ext cx="424477" cy="607579"/>
+          </a:xfrm>
+          <a:prstGeom prst="bentConnector3">
+            <a:avLst>
+              <a:gd name="adj1" fmla="val 52660"/>
+            </a:avLst>
+          </a:prstGeom>
+          <a:ln w="19050">
+            <a:headEnd type="none" w="med" len="med"/>
+            <a:tailEnd type="arrow" w="med" len="med"/>
+          </a:ln>
+          <a:effectLst/>
+        </p:spPr>
+        <p:style>
+          <a:lnRef idx="1">
+            <a:schemeClr val="accent6"/>
+          </a:lnRef>
+          <a:fillRef idx="2">
+            <a:schemeClr val="accent6"/>
+          </a:fillRef>
+          <a:effectRef idx="1">
+            <a:schemeClr val="accent6"/>
+          </a:effectRef>
+          <a:fontRef idx="minor">
+            <a:schemeClr val="dk1"/>
+          </a:fontRef>
+        </p:style>
+      </p:cxnSp>
+      <p:sp>
+        <p:nvSpPr>
+          <p:cNvPr id="88" name="Rectangle 87">
+            <a:extLst>
+              <a:ext uri="{FF2B5EF4-FFF2-40B4-BE49-F238E27FC236}">
+                <a16:creationId xmlns:a16="http://schemas.microsoft.com/office/drawing/2014/main" id="{2A7039A0-835D-4B08-BDF5-523F0B1A0C09}"/>
+              </a:ext>
+            </a:extLst>
+          </p:cNvPr>
+          <p:cNvSpPr/>
+          <p:nvPr/>
+        </p:nvSpPr>
+        <p:spPr>
+          <a:xfrm>
+            <a:off x="5105400" y="3158440"/>
+            <a:ext cx="929296" cy="346760"/>
+          </a:xfrm>
+          <a:prstGeom prst="rect">
+            <a:avLst/>
+          </a:prstGeom>
+          <a:ln w="19050"/>
+          <a:effectLst/>
+        </p:spPr>
+        <p:style>
+          <a:lnRef idx="1">
+            <a:schemeClr val="accent6"/>
+          </a:lnRef>
+          <a:fillRef idx="2">
+            <a:schemeClr val="accent6"/>
+          </a:fillRef>
+          <a:effectRef idx="1">
+            <a:schemeClr val="accent6"/>
+          </a:effectRef>
+          <a:fontRef idx="minor">
+            <a:schemeClr val="dk1"/>
+          </a:fontRef>
+        </p:style>
+        <p:txBody>
+          <a:bodyPr rtlCol="0" anchor="ctr"/>
+          <a:lstStyle/>
+          <a:p>
+            <a:pPr algn="ctr"/>
+            <a:r>
+              <a:rPr lang="en-US" sz="1050" dirty="0"/>
+              <a:t>Unique</a:t>
+            </a:r>
+            <a:br>
+              <a:rPr lang="en-US" sz="1050" dirty="0"/>
+            </a:br>
+            <a:r>
+              <a:rPr lang="en-US" sz="1050" dirty="0"/>
+              <a:t>PO List</a:t>
+            </a:r>
+            <a:endParaRPr lang="en-SG" sz="1050" dirty="0"/>
+          </a:p>
+        </p:txBody>
+      </p:sp>
+      <p:sp>
+        <p:nvSpPr>
+          <p:cNvPr id="94" name="Flowchart: Decision 93">
+            <a:extLst>
+              <a:ext uri="{FF2B5EF4-FFF2-40B4-BE49-F238E27FC236}">
+                <a16:creationId xmlns:a16="http://schemas.microsoft.com/office/drawing/2014/main" id="{B74FEDD0-2E47-4DCA-A619-CE60AB0A6028}"/>
+              </a:ext>
+            </a:extLst>
+          </p:cNvPr>
+          <p:cNvSpPr/>
+          <p:nvPr/>
+        </p:nvSpPr>
+        <p:spPr>
+          <a:xfrm>
+            <a:off x="6024672" y="3245130"/>
+            <a:ext cx="236048" cy="173380"/>
+          </a:xfrm>
+          <a:prstGeom prst="flowChartDecision">
+            <a:avLst/>
+          </a:prstGeom>
+          <a:noFill/>
+          <a:ln w="19050"/>
+          <a:effectLst/>
+        </p:spPr>
+        <p:style>
+          <a:lnRef idx="1">
+            <a:schemeClr val="accent6"/>
+          </a:lnRef>
+          <a:fillRef idx="2">
+            <a:schemeClr val="accent6"/>
+          </a:fillRef>
+          <a:effectRef idx="1">
+            <a:schemeClr val="accent6"/>
+          </a:effectRef>
+          <a:fontRef idx="minor">
+            <a:schemeClr val="dk1"/>
+          </a:fontRef>
+        </p:style>
+        <p:txBody>
+          <a:bodyPr rtlCol="0" anchor="ctr"/>
+          <a:lstStyle/>
+          <a:p>
+            <a:pPr algn="ctr"/>
+            <a:endParaRPr lang="en-US" sz="1050"/>
+          </a:p>
+        </p:txBody>
+      </p:sp>
+      <p:cxnSp>
+        <p:nvCxnSpPr>
+          <p:cNvPr id="97" name="Elbow Connector 50">
+            <a:extLst>
+              <a:ext uri="{FF2B5EF4-FFF2-40B4-BE49-F238E27FC236}">
+                <a16:creationId xmlns:a16="http://schemas.microsoft.com/office/drawing/2014/main" id="{A968DDFA-83A8-4905-982D-7B493FE350BC}"/>
+              </a:ext>
+            </a:extLst>
+          </p:cNvPr>
+          <p:cNvCxnSpPr>
+            <a:cxnSpLocks/>
+            <a:endCxn id="74" idx="1"/>
+          </p:cNvCxnSpPr>
+          <p:nvPr/>
+        </p:nvCxnSpPr>
+        <p:spPr>
+          <a:xfrm rot="16200000" flipH="1">
+            <a:off x="6160964" y="3418691"/>
+            <a:ext cx="561296" cy="386423"/>
+          </a:xfrm>
+          <a:prstGeom prst="bentConnector2">
+            <a:avLst/>
+          </a:prstGeom>
+          <a:ln w="19050">
+            <a:headEnd type="none" w="med" len="med"/>
+            <a:tailEnd type="arrow" w="med" len="med"/>
+          </a:ln>
+          <a:effectLst/>
+        </p:spPr>
+        <p:style>
+          <a:lnRef idx="1">
+            <a:schemeClr val="accent6"/>
+          </a:lnRef>
+          <a:fillRef idx="2">
+            <a:schemeClr val="accent6"/>
+          </a:fillRef>
+          <a:effectRef idx="1">
+            <a:schemeClr val="accent6"/>
+          </a:effectRef>
+          <a:fontRef idx="minor">
+            <a:schemeClr val="dk1"/>
+          </a:fontRef>
+        </p:style>
+      </p:cxnSp>
+      <p:sp>
+        <p:nvSpPr>
+          <p:cNvPr id="105" name="Rectangle 104">
+            <a:extLst>
+              <a:ext uri="{FF2B5EF4-FFF2-40B4-BE49-F238E27FC236}">
+                <a16:creationId xmlns:a16="http://schemas.microsoft.com/office/drawing/2014/main" id="{097DF590-D5A6-4E3D-AC7E-F2CB3B52798A}"/>
+              </a:ext>
+            </a:extLst>
+          </p:cNvPr>
+          <p:cNvSpPr/>
+          <p:nvPr/>
+        </p:nvSpPr>
+        <p:spPr>
+          <a:xfrm>
+            <a:off x="6629400" y="3006040"/>
+            <a:ext cx="929296" cy="346760"/>
+          </a:xfrm>
+          <a:prstGeom prst="rect">
+            <a:avLst/>
+          </a:prstGeom>
+          <a:solidFill>
+            <a:schemeClr val="tx2">
+              <a:lumMod val="60000"/>
+              <a:lumOff val="40000"/>
+            </a:schemeClr>
+          </a:solidFill>
+          <a:ln w="19050">
+            <a:solidFill>
+              <a:srgbClr val="7030A0"/>
+            </a:solidFill>
+          </a:ln>
+          <a:effectLst/>
+        </p:spPr>
+        <p:style>
+          <a:lnRef idx="1">
+            <a:schemeClr val="accent6"/>
+          </a:lnRef>
+          <a:fillRef idx="2">
+            <a:schemeClr val="accent6"/>
+          </a:fillRef>
+          <a:effectRef idx="1">
+            <a:schemeClr val="accent6"/>
+          </a:effectRef>
+          <a:fontRef idx="minor">
+            <a:schemeClr val="dk1"/>
+          </a:fontRef>
+        </p:style>
+        <p:txBody>
+          <a:bodyPr rtlCol="0" anchor="ctr"/>
+          <a:lstStyle/>
+          <a:p>
+            <a:pPr algn="ctr"/>
+            <a:r>
+              <a:rPr lang="en-US" sz="1050" dirty="0">
+                <a:solidFill>
+                  <a:schemeClr val="bg1"/>
+                </a:solidFill>
+              </a:rPr>
+              <a:t>Headquarters Personnel</a:t>
+            </a:r>
+            <a:endParaRPr lang="en-SG" sz="1050" dirty="0">
+              <a:solidFill>
+                <a:schemeClr val="bg1"/>
+              </a:solidFill>
+            </a:endParaRPr>
+          </a:p>
+        </p:txBody>
+      </p:sp>
+      <p:sp>
+        <p:nvSpPr>
+          <p:cNvPr id="112" name="Isosceles Triangle 111">
+            <a:extLst>
+              <a:ext uri="{FF2B5EF4-FFF2-40B4-BE49-F238E27FC236}">
+                <a16:creationId xmlns:a16="http://schemas.microsoft.com/office/drawing/2014/main" id="{F965785F-F654-463C-9276-EF6EB9BF87AE}"/>
+              </a:ext>
+            </a:extLst>
+          </p:cNvPr>
+          <p:cNvSpPr/>
+          <p:nvPr/>
+        </p:nvSpPr>
+        <p:spPr>
+          <a:xfrm rot="10800000">
+            <a:off x="6968496" y="3530155"/>
+            <a:ext cx="270504" cy="175523"/>
+          </a:xfrm>
+          <a:prstGeom prst="triangle">
+            <a:avLst/>
+          </a:prstGeom>
+          <a:ln w="19050"/>
+          <a:effectLst/>
+        </p:spPr>
+        <p:style>
+          <a:lnRef idx="1">
+            <a:schemeClr val="accent4"/>
+          </a:lnRef>
+          <a:fillRef idx="2">
+            <a:schemeClr val="accent4"/>
+          </a:fillRef>
+          <a:effectRef idx="1">
+            <a:schemeClr val="accent4"/>
+          </a:effectRef>
+          <a:fontRef idx="minor">
+            <a:schemeClr val="dk1"/>
+          </a:fontRef>
+        </p:style>
+        <p:txBody>
+          <a:bodyPr rtlCol="0" anchor="ctr"/>
+          <a:lstStyle/>
+          <a:p>
+            <a:pPr algn="ctr"/>
+            <a:endParaRPr lang="en-SG" sz="1050"/>
+          </a:p>
+        </p:txBody>
+      </p:sp>
+      <p:sp>
+        <p:nvSpPr>
+          <p:cNvPr id="83" name="TextBox 82">
+            <a:extLst>
+              <a:ext uri="{FF2B5EF4-FFF2-40B4-BE49-F238E27FC236}">
+                <a16:creationId xmlns:a16="http://schemas.microsoft.com/office/drawing/2014/main" id="{D3AE25A4-587A-4584-BD16-A911D24ACD4E}"/>
+              </a:ext>
+            </a:extLst>
+          </p:cNvPr>
+          <p:cNvSpPr txBox="1"/>
+          <p:nvPr/>
+        </p:nvSpPr>
+        <p:spPr>
+          <a:xfrm>
+            <a:off x="7960690" y="3440668"/>
             <a:ext cx="88232" cy="369332"/>
           </a:xfrm>
           <a:prstGeom prst="rect">

</xml_diff>

<commit_message>
Edited addSequenceDiagram and changed visual aesthetics for UI.
</commit_message>
<xml_diff>
--- a/docs/Diagrams.pptx
+++ b/docs/Diagrams.pptx
@@ -5,13 +5,14 @@
     <p:sldMasterId id="2147483648" r:id="rId1"/>
   </p:sldMasterIdLst>
   <p:notesMasterIdLst>
-    <p:notesMasterId r:id="rId6"/>
+    <p:notesMasterId r:id="rId7"/>
   </p:notesMasterIdLst>
   <p:sldIdLst>
     <p:sldId id="256" r:id="rId2"/>
     <p:sldId id="257" r:id="rId3"/>
     <p:sldId id="259" r:id="rId4"/>
     <p:sldId id="258" r:id="rId5"/>
+    <p:sldId id="260" r:id="rId6"/>
   </p:sldIdLst>
   <p:sldSz cx="9144000" cy="6858000" type="screen4x3"/>
   <p:notesSz cx="6858000" cy="9144000"/>
@@ -211,7 +212,7 @@
           <a:p>
             <a:fld id="{F5CC4B3F-88C1-4FFA-B1B6-F41C21DC6924}" type="datetimeFigureOut">
               <a:rPr lang="en-US" smtClean="0"/>
-              <a:t>9/20/2018</a:t>
+              <a:t>10/4/2018</a:t>
             </a:fld>
             <a:endParaRPr lang="en-US"/>
           </a:p>
@@ -741,7 +742,7 @@
           <a:p>
             <a:fld id="{78C97017-6FC3-485B-9764-EAC9E56C1D49}" type="datetimeFigureOut">
               <a:rPr lang="en-US" smtClean="0"/>
-              <a:t>9/20/2018</a:t>
+              <a:t>10/4/2018</a:t>
             </a:fld>
             <a:endParaRPr lang="en-US"/>
           </a:p>
@@ -909,7 +910,7 @@
           <a:p>
             <a:fld id="{78C97017-6FC3-485B-9764-EAC9E56C1D49}" type="datetimeFigureOut">
               <a:rPr lang="en-US" smtClean="0"/>
-              <a:t>9/20/2018</a:t>
+              <a:t>10/4/2018</a:t>
             </a:fld>
             <a:endParaRPr lang="en-US"/>
           </a:p>
@@ -1087,7 +1088,7 @@
           <a:p>
             <a:fld id="{78C97017-6FC3-485B-9764-EAC9E56C1D49}" type="datetimeFigureOut">
               <a:rPr lang="en-US" smtClean="0"/>
-              <a:t>9/20/2018</a:t>
+              <a:t>10/4/2018</a:t>
             </a:fld>
             <a:endParaRPr lang="en-US"/>
           </a:p>
@@ -1255,7 +1256,7 @@
           <a:p>
             <a:fld id="{78C97017-6FC3-485B-9764-EAC9E56C1D49}" type="datetimeFigureOut">
               <a:rPr lang="en-US" smtClean="0"/>
-              <a:t>9/20/2018</a:t>
+              <a:t>10/4/2018</a:t>
             </a:fld>
             <a:endParaRPr lang="en-US"/>
           </a:p>
@@ -1500,7 +1501,7 @@
           <a:p>
             <a:fld id="{78C97017-6FC3-485B-9764-EAC9E56C1D49}" type="datetimeFigureOut">
               <a:rPr lang="en-US" smtClean="0"/>
-              <a:t>9/20/2018</a:t>
+              <a:t>10/4/2018</a:t>
             </a:fld>
             <a:endParaRPr lang="en-US"/>
           </a:p>
@@ -1785,7 +1786,7 @@
           <a:p>
             <a:fld id="{78C97017-6FC3-485B-9764-EAC9E56C1D49}" type="datetimeFigureOut">
               <a:rPr lang="en-US" smtClean="0"/>
-              <a:t>9/20/2018</a:t>
+              <a:t>10/4/2018</a:t>
             </a:fld>
             <a:endParaRPr lang="en-US"/>
           </a:p>
@@ -2204,7 +2205,7 @@
           <a:p>
             <a:fld id="{78C97017-6FC3-485B-9764-EAC9E56C1D49}" type="datetimeFigureOut">
               <a:rPr lang="en-US" smtClean="0"/>
-              <a:t>9/20/2018</a:t>
+              <a:t>10/4/2018</a:t>
             </a:fld>
             <a:endParaRPr lang="en-US"/>
           </a:p>
@@ -2321,7 +2322,7 @@
           <a:p>
             <a:fld id="{78C97017-6FC3-485B-9764-EAC9E56C1D49}" type="datetimeFigureOut">
               <a:rPr lang="en-US" smtClean="0"/>
-              <a:t>9/20/2018</a:t>
+              <a:t>10/4/2018</a:t>
             </a:fld>
             <a:endParaRPr lang="en-US"/>
           </a:p>
@@ -2416,7 +2417,7 @@
           <a:p>
             <a:fld id="{78C97017-6FC3-485B-9764-EAC9E56C1D49}" type="datetimeFigureOut">
               <a:rPr lang="en-US" smtClean="0"/>
-              <a:t>9/20/2018</a:t>
+              <a:t>10/4/2018</a:t>
             </a:fld>
             <a:endParaRPr lang="en-US"/>
           </a:p>
@@ -2691,7 +2692,7 @@
           <a:p>
             <a:fld id="{78C97017-6FC3-485B-9764-EAC9E56C1D49}" type="datetimeFigureOut">
               <a:rPr lang="en-US" smtClean="0"/>
-              <a:t>9/20/2018</a:t>
+              <a:t>10/4/2018</a:t>
             </a:fld>
             <a:endParaRPr lang="en-US"/>
           </a:p>
@@ -2943,7 +2944,7 @@
           <a:p>
             <a:fld id="{78C97017-6FC3-485B-9764-EAC9E56C1D49}" type="datetimeFigureOut">
               <a:rPr lang="en-US" smtClean="0"/>
-              <a:t>9/20/2018</a:t>
+              <a:t>10/4/2018</a:t>
             </a:fld>
             <a:endParaRPr lang="en-US"/>
           </a:p>
@@ -3154,7 +3155,7 @@
           <a:p>
             <a:fld id="{78C97017-6FC3-485B-9764-EAC9E56C1D49}" type="datetimeFigureOut">
               <a:rPr lang="en-US" smtClean="0"/>
-              <a:t>9/20/2018</a:t>
+              <a:t>10/4/2018</a:t>
             </a:fld>
             <a:endParaRPr lang="en-US"/>
           </a:p>
@@ -10018,6 +10019,1446 @@
     <p:extLst>
       <p:ext uri="{BB962C8B-B14F-4D97-AF65-F5344CB8AC3E}">
         <p14:creationId xmlns:p14="http://schemas.microsoft.com/office/powerpoint/2010/main" val="2619388383"/>
+      </p:ext>
+    </p:extLst>
+  </p:cSld>
+  <p:clrMapOvr>
+    <a:masterClrMapping/>
+  </p:clrMapOvr>
+</p:sld>
+</file>
+
+<file path=ppt/slides/slide5.xml><?xml version="1.0" encoding="utf-8"?>
+<p:sld xmlns:a="http://schemas.openxmlformats.org/drawingml/2006/main" xmlns:r="http://schemas.openxmlformats.org/officeDocument/2006/relationships" xmlns:p="http://schemas.openxmlformats.org/presentationml/2006/main">
+  <p:cSld>
+    <p:spTree>
+      <p:nvGrpSpPr>
+        <p:cNvPr id="1" name=""/>
+        <p:cNvGrpSpPr/>
+        <p:nvPr/>
+      </p:nvGrpSpPr>
+      <p:grpSpPr>
+        <a:xfrm>
+          <a:off x="0" y="0"/>
+          <a:ext cx="0" cy="0"/>
+          <a:chOff x="0" y="0"/>
+          <a:chExt cx="0" cy="0"/>
+        </a:xfrm>
+      </p:grpSpPr>
+      <p:sp>
+        <p:nvSpPr>
+          <p:cNvPr id="51" name="Rectangle 50">
+            <a:extLst>
+              <a:ext uri="{FF2B5EF4-FFF2-40B4-BE49-F238E27FC236}">
+                <a16:creationId xmlns:a16="http://schemas.microsoft.com/office/drawing/2014/main" id="{2739E19F-6A0A-4032-B1FE-A3B5C5FD4152}"/>
+              </a:ext>
+            </a:extLst>
+          </p:cNvPr>
+          <p:cNvSpPr/>
+          <p:nvPr/>
+        </p:nvSpPr>
+        <p:spPr>
+          <a:xfrm>
+            <a:off x="1143001" y="4094654"/>
+            <a:ext cx="5048121" cy="1612181"/>
+          </a:xfrm>
+          <a:prstGeom prst="rect">
+            <a:avLst/>
+          </a:prstGeom>
+          <a:noFill/>
+          <a:ln w="3175">
+            <a:solidFill>
+              <a:schemeClr val="accent6"/>
+            </a:solidFill>
+          </a:ln>
+        </p:spPr>
+        <p:style>
+          <a:lnRef idx="2">
+            <a:schemeClr val="accent1">
+              <a:shade val="50000"/>
+            </a:schemeClr>
+          </a:lnRef>
+          <a:fillRef idx="1">
+            <a:schemeClr val="accent1"/>
+          </a:fillRef>
+          <a:effectRef idx="0">
+            <a:schemeClr val="accent1"/>
+          </a:effectRef>
+          <a:fontRef idx="minor">
+            <a:schemeClr val="lt1"/>
+          </a:fontRef>
+        </p:style>
+        <p:txBody>
+          <a:bodyPr rtlCol="0" anchor="ctr"/>
+          <a:lstStyle/>
+          <a:p>
+            <a:pPr algn="ctr"/>
+            <a:endParaRPr lang="en-SG">
+              <a:solidFill>
+                <a:schemeClr val="accent4">
+                  <a:lumMod val="75000"/>
+                </a:schemeClr>
+              </a:solidFill>
+            </a:endParaRPr>
+          </a:p>
+        </p:txBody>
+      </p:sp>
+      <p:cxnSp>
+        <p:nvCxnSpPr>
+          <p:cNvPr id="53" name="Straight Connector 52">
+            <a:extLst>
+              <a:ext uri="{FF2B5EF4-FFF2-40B4-BE49-F238E27FC236}">
+                <a16:creationId xmlns:a16="http://schemas.microsoft.com/office/drawing/2014/main" id="{5DB58E2D-B72E-497D-99D0-858EF4AE2596}"/>
+              </a:ext>
+            </a:extLst>
+          </p:cNvPr>
+          <p:cNvCxnSpPr>
+            <a:cxnSpLocks/>
+            <a:stCxn id="51" idx="1"/>
+            <a:endCxn id="51" idx="3"/>
+          </p:cNvCxnSpPr>
+          <p:nvPr/>
+        </p:nvCxnSpPr>
+        <p:spPr>
+          <a:xfrm>
+            <a:off x="1143001" y="4900745"/>
+            <a:ext cx="5048121" cy="0"/>
+          </a:xfrm>
+          <a:prstGeom prst="line">
+            <a:avLst/>
+          </a:prstGeom>
+          <a:ln>
+            <a:solidFill>
+              <a:schemeClr val="accent6"/>
+            </a:solidFill>
+          </a:ln>
+        </p:spPr>
+        <p:style>
+          <a:lnRef idx="1">
+            <a:schemeClr val="accent1"/>
+          </a:lnRef>
+          <a:fillRef idx="0">
+            <a:schemeClr val="accent1"/>
+          </a:fillRef>
+          <a:effectRef idx="0">
+            <a:schemeClr val="accent1"/>
+          </a:effectRef>
+          <a:fontRef idx="minor">
+            <a:schemeClr val="tx1"/>
+          </a:fontRef>
+        </p:style>
+      </p:cxnSp>
+      <p:sp>
+        <p:nvSpPr>
+          <p:cNvPr id="2" name="Rectangle 1">
+            <a:extLst>
+              <a:ext uri="{FF2B5EF4-FFF2-40B4-BE49-F238E27FC236}">
+                <a16:creationId xmlns:a16="http://schemas.microsoft.com/office/drawing/2014/main" id="{8F392A63-F99C-4F28-8F17-D5041C8813CE}"/>
+              </a:ext>
+            </a:extLst>
+          </p:cNvPr>
+          <p:cNvSpPr/>
+          <p:nvPr/>
+        </p:nvSpPr>
+        <p:spPr>
+          <a:xfrm>
+            <a:off x="1295400" y="762000"/>
+            <a:ext cx="2514600" cy="609600"/>
+          </a:xfrm>
+          <a:prstGeom prst="rect">
+            <a:avLst/>
+          </a:prstGeom>
+        </p:spPr>
+        <p:style>
+          <a:lnRef idx="2">
+            <a:schemeClr val="accent1">
+              <a:shade val="50000"/>
+            </a:schemeClr>
+          </a:lnRef>
+          <a:fillRef idx="1">
+            <a:schemeClr val="accent1"/>
+          </a:fillRef>
+          <a:effectRef idx="0">
+            <a:schemeClr val="accent1"/>
+          </a:effectRef>
+          <a:fontRef idx="minor">
+            <a:schemeClr val="lt1"/>
+          </a:fontRef>
+        </p:style>
+        <p:txBody>
+          <a:bodyPr rtlCol="0" anchor="ctr"/>
+          <a:lstStyle/>
+          <a:p>
+            <a:pPr algn="ctr"/>
+            <a:r>
+              <a:rPr lang="en-SG" sz="2800" dirty="0"/>
+              <a:t>:Logic</a:t>
+            </a:r>
+          </a:p>
+        </p:txBody>
+      </p:sp>
+      <p:sp>
+        <p:nvSpPr>
+          <p:cNvPr id="5" name="Rectangle 4">
+            <a:extLst>
+              <a:ext uri="{FF2B5EF4-FFF2-40B4-BE49-F238E27FC236}">
+                <a16:creationId xmlns:a16="http://schemas.microsoft.com/office/drawing/2014/main" id="{C93342F8-1A19-47B3-A61D-BB9CBAB9441A}"/>
+              </a:ext>
+            </a:extLst>
+          </p:cNvPr>
+          <p:cNvSpPr/>
+          <p:nvPr/>
+        </p:nvSpPr>
+        <p:spPr>
+          <a:xfrm>
+            <a:off x="5181600" y="1828800"/>
+            <a:ext cx="2514600" cy="609600"/>
+          </a:xfrm>
+          <a:prstGeom prst="rect">
+            <a:avLst/>
+          </a:prstGeom>
+          <a:solidFill>
+            <a:schemeClr val="accent2"/>
+          </a:solidFill>
+        </p:spPr>
+        <p:style>
+          <a:lnRef idx="2">
+            <a:schemeClr val="accent1">
+              <a:shade val="50000"/>
+            </a:schemeClr>
+          </a:lnRef>
+          <a:fillRef idx="1">
+            <a:schemeClr val="accent1"/>
+          </a:fillRef>
+          <a:effectRef idx="0">
+            <a:schemeClr val="accent1"/>
+          </a:effectRef>
+          <a:fontRef idx="minor">
+            <a:schemeClr val="lt1"/>
+          </a:fontRef>
+        </p:style>
+        <p:txBody>
+          <a:bodyPr rtlCol="0" anchor="ctr"/>
+          <a:lstStyle/>
+          <a:p>
+            <a:pPr algn="ctr"/>
+            <a:r>
+              <a:rPr lang="en-SG" sz="2400" dirty="0" err="1"/>
+              <a:t>toAdd:Person</a:t>
+            </a:r>
+            <a:endParaRPr lang="en-SG" sz="2400" dirty="0"/>
+          </a:p>
+        </p:txBody>
+      </p:sp>
+      <p:cxnSp>
+        <p:nvCxnSpPr>
+          <p:cNvPr id="7" name="Straight Connector 6">
+            <a:extLst>
+              <a:ext uri="{FF2B5EF4-FFF2-40B4-BE49-F238E27FC236}">
+                <a16:creationId xmlns:a16="http://schemas.microsoft.com/office/drawing/2014/main" id="{64867AB9-CE25-4DB7-9ED8-315F1D383D38}"/>
+              </a:ext>
+            </a:extLst>
+          </p:cNvPr>
+          <p:cNvCxnSpPr>
+            <a:stCxn id="2" idx="2"/>
+          </p:cNvCxnSpPr>
+          <p:nvPr/>
+        </p:nvCxnSpPr>
+        <p:spPr>
+          <a:xfrm>
+            <a:off x="2552700" y="1371600"/>
+            <a:ext cx="0" cy="609600"/>
+          </a:xfrm>
+          <a:prstGeom prst="line">
+            <a:avLst/>
+          </a:prstGeom>
+          <a:ln>
+            <a:prstDash val="dash"/>
+          </a:ln>
+        </p:spPr>
+        <p:style>
+          <a:lnRef idx="1">
+            <a:schemeClr val="accent1"/>
+          </a:lnRef>
+          <a:fillRef idx="0">
+            <a:schemeClr val="accent1"/>
+          </a:fillRef>
+          <a:effectRef idx="0">
+            <a:schemeClr val="accent1"/>
+          </a:effectRef>
+          <a:fontRef idx="minor">
+            <a:schemeClr val="tx1"/>
+          </a:fontRef>
+        </p:style>
+      </p:cxnSp>
+      <p:sp>
+        <p:nvSpPr>
+          <p:cNvPr id="8" name="Rectangle 7">
+            <a:extLst>
+              <a:ext uri="{FF2B5EF4-FFF2-40B4-BE49-F238E27FC236}">
+                <a16:creationId xmlns:a16="http://schemas.microsoft.com/office/drawing/2014/main" id="{8DB9BE01-D289-455E-BF06-E870B953F7BB}"/>
+              </a:ext>
+            </a:extLst>
+          </p:cNvPr>
+          <p:cNvSpPr/>
+          <p:nvPr/>
+        </p:nvSpPr>
+        <p:spPr>
+          <a:xfrm rot="5400000">
+            <a:off x="568475" y="3845106"/>
+            <a:ext cx="3930304" cy="266664"/>
+          </a:xfrm>
+          <a:prstGeom prst="rect">
+            <a:avLst/>
+          </a:prstGeom>
+          <a:noFill/>
+        </p:spPr>
+        <p:style>
+          <a:lnRef idx="2">
+            <a:schemeClr val="accent1">
+              <a:shade val="50000"/>
+            </a:schemeClr>
+          </a:lnRef>
+          <a:fillRef idx="1">
+            <a:schemeClr val="accent1"/>
+          </a:fillRef>
+          <a:effectRef idx="0">
+            <a:schemeClr val="accent1"/>
+          </a:effectRef>
+          <a:fontRef idx="minor">
+            <a:schemeClr val="lt1"/>
+          </a:fontRef>
+        </p:style>
+        <p:txBody>
+          <a:bodyPr rtlCol="0" anchor="ctr"/>
+          <a:lstStyle/>
+          <a:p>
+            <a:pPr algn="ctr"/>
+            <a:endParaRPr lang="en-SG" dirty="0"/>
+          </a:p>
+        </p:txBody>
+      </p:sp>
+      <p:cxnSp>
+        <p:nvCxnSpPr>
+          <p:cNvPr id="9" name="Straight Connector 8">
+            <a:extLst>
+              <a:ext uri="{FF2B5EF4-FFF2-40B4-BE49-F238E27FC236}">
+                <a16:creationId xmlns:a16="http://schemas.microsoft.com/office/drawing/2014/main" id="{8FDC22F2-9F6B-4193-B5C1-14995FB9803C}"/>
+              </a:ext>
+            </a:extLst>
+          </p:cNvPr>
+          <p:cNvCxnSpPr>
+            <a:cxnSpLocks/>
+          </p:cNvCxnSpPr>
+          <p:nvPr/>
+        </p:nvCxnSpPr>
+        <p:spPr>
+          <a:xfrm>
+            <a:off x="457200" y="1981200"/>
+            <a:ext cx="1943099" cy="0"/>
+          </a:xfrm>
+          <a:prstGeom prst="line">
+            <a:avLst/>
+          </a:prstGeom>
+          <a:ln w="12700">
+            <a:solidFill>
+              <a:srgbClr val="00B050"/>
+            </a:solidFill>
+            <a:prstDash val="solid"/>
+            <a:headEnd type="none" w="lg" len="lg"/>
+            <a:tailEnd type="triangle" w="med" len="med"/>
+          </a:ln>
+        </p:spPr>
+        <p:style>
+          <a:lnRef idx="1">
+            <a:schemeClr val="accent1"/>
+          </a:lnRef>
+          <a:fillRef idx="0">
+            <a:schemeClr val="accent1"/>
+          </a:fillRef>
+          <a:effectRef idx="0">
+            <a:schemeClr val="accent1"/>
+          </a:effectRef>
+          <a:fontRef idx="minor">
+            <a:schemeClr val="tx1"/>
+          </a:fontRef>
+        </p:style>
+      </p:cxnSp>
+      <p:sp>
+        <p:nvSpPr>
+          <p:cNvPr id="13" name="TextBox 12">
+            <a:extLst>
+              <a:ext uri="{FF2B5EF4-FFF2-40B4-BE49-F238E27FC236}">
+                <a16:creationId xmlns:a16="http://schemas.microsoft.com/office/drawing/2014/main" id="{283F72D7-3BC0-44EF-8FBD-0731BC6E64F5}"/>
+              </a:ext>
+            </a:extLst>
+          </p:cNvPr>
+          <p:cNvSpPr txBox="1"/>
+          <p:nvPr/>
+        </p:nvSpPr>
+        <p:spPr>
+          <a:xfrm>
+            <a:off x="609600" y="1611868"/>
+            <a:ext cx="1752595" cy="369332"/>
+          </a:xfrm>
+          <a:prstGeom prst="rect">
+            <a:avLst/>
+          </a:prstGeom>
+          <a:noFill/>
+          <a:ln>
+            <a:noFill/>
+          </a:ln>
+        </p:spPr>
+        <p:txBody>
+          <a:bodyPr wrap="square" rtlCol="0">
+            <a:spAutoFit/>
+          </a:bodyPr>
+          <a:lstStyle/>
+          <a:p>
+            <a:r>
+              <a:rPr lang="en-SG" dirty="0" err="1">
+                <a:solidFill>
+                  <a:srgbClr val="00B050"/>
+                </a:solidFill>
+              </a:rPr>
+              <a:t>AddCommand</a:t>
+            </a:r>
+            <a:r>
+              <a:rPr lang="en-SG" dirty="0">
+                <a:solidFill>
+                  <a:srgbClr val="00B050"/>
+                </a:solidFill>
+              </a:rPr>
+              <a:t>()</a:t>
+            </a:r>
+          </a:p>
+        </p:txBody>
+      </p:sp>
+      <p:cxnSp>
+        <p:nvCxnSpPr>
+          <p:cNvPr id="15" name="Straight Connector 14">
+            <a:extLst>
+              <a:ext uri="{FF2B5EF4-FFF2-40B4-BE49-F238E27FC236}">
+                <a16:creationId xmlns:a16="http://schemas.microsoft.com/office/drawing/2014/main" id="{C0F65CBC-AACD-4B1C-B663-86A1F2E9F002}"/>
+              </a:ext>
+            </a:extLst>
+          </p:cNvPr>
+          <p:cNvCxnSpPr>
+            <a:cxnSpLocks/>
+          </p:cNvCxnSpPr>
+          <p:nvPr/>
+        </p:nvCxnSpPr>
+        <p:spPr>
+          <a:xfrm>
+            <a:off x="2666959" y="2133600"/>
+            <a:ext cx="2514641" cy="0"/>
+          </a:xfrm>
+          <a:prstGeom prst="line">
+            <a:avLst/>
+          </a:prstGeom>
+          <a:ln w="12700">
+            <a:solidFill>
+              <a:schemeClr val="accent4">
+                <a:lumMod val="75000"/>
+              </a:schemeClr>
+            </a:solidFill>
+            <a:prstDash val="solid"/>
+            <a:headEnd type="none" w="lg" len="lg"/>
+            <a:tailEnd type="triangle" w="med" len="med"/>
+          </a:ln>
+        </p:spPr>
+        <p:style>
+          <a:lnRef idx="1">
+            <a:schemeClr val="accent1"/>
+          </a:lnRef>
+          <a:fillRef idx="0">
+            <a:schemeClr val="accent1"/>
+          </a:fillRef>
+          <a:effectRef idx="0">
+            <a:schemeClr val="accent1"/>
+          </a:effectRef>
+          <a:fontRef idx="minor">
+            <a:schemeClr val="tx1"/>
+          </a:fontRef>
+        </p:style>
+      </p:cxnSp>
+      <p:sp>
+        <p:nvSpPr>
+          <p:cNvPr id="16" name="TextBox 15">
+            <a:extLst>
+              <a:ext uri="{FF2B5EF4-FFF2-40B4-BE49-F238E27FC236}">
+                <a16:creationId xmlns:a16="http://schemas.microsoft.com/office/drawing/2014/main" id="{3918BC11-B398-4FAB-ABB2-837DADD55259}"/>
+              </a:ext>
+            </a:extLst>
+          </p:cNvPr>
+          <p:cNvSpPr txBox="1"/>
+          <p:nvPr/>
+        </p:nvSpPr>
+        <p:spPr>
+          <a:xfrm>
+            <a:off x="3257552" y="1676400"/>
+            <a:ext cx="1371596" cy="461665"/>
+          </a:xfrm>
+          <a:prstGeom prst="rect">
+            <a:avLst/>
+          </a:prstGeom>
+          <a:noFill/>
+          <a:ln>
+            <a:noFill/>
+          </a:ln>
+        </p:spPr>
+        <p:txBody>
+          <a:bodyPr wrap="square" rtlCol="0">
+            <a:spAutoFit/>
+          </a:bodyPr>
+          <a:lstStyle/>
+          <a:p>
+            <a:r>
+              <a:rPr lang="en-SG" sz="2400" dirty="0">
+                <a:solidFill>
+                  <a:schemeClr val="accent4">
+                    <a:lumMod val="75000"/>
+                  </a:schemeClr>
+                </a:solidFill>
+              </a:rPr>
+              <a:t>Person()</a:t>
+            </a:r>
+          </a:p>
+        </p:txBody>
+      </p:sp>
+      <p:sp>
+        <p:nvSpPr>
+          <p:cNvPr id="22" name="Rectangle 21">
+            <a:extLst>
+              <a:ext uri="{FF2B5EF4-FFF2-40B4-BE49-F238E27FC236}">
+                <a16:creationId xmlns:a16="http://schemas.microsoft.com/office/drawing/2014/main" id="{979A54E4-F673-470C-B497-BA3C36932D8A}"/>
+              </a:ext>
+            </a:extLst>
+          </p:cNvPr>
+          <p:cNvSpPr/>
+          <p:nvPr/>
+        </p:nvSpPr>
+        <p:spPr>
+          <a:xfrm rot="5400000">
+            <a:off x="6253453" y="2547683"/>
+            <a:ext cx="485229" cy="266662"/>
+          </a:xfrm>
+          <a:prstGeom prst="rect">
+            <a:avLst/>
+          </a:prstGeom>
+          <a:noFill/>
+          <a:ln>
+            <a:solidFill>
+              <a:schemeClr val="accent2">
+                <a:lumMod val="75000"/>
+              </a:schemeClr>
+            </a:solidFill>
+          </a:ln>
+        </p:spPr>
+        <p:style>
+          <a:lnRef idx="2">
+            <a:schemeClr val="accent1">
+              <a:shade val="50000"/>
+            </a:schemeClr>
+          </a:lnRef>
+          <a:fillRef idx="1">
+            <a:schemeClr val="accent1"/>
+          </a:fillRef>
+          <a:effectRef idx="0">
+            <a:schemeClr val="accent1"/>
+          </a:effectRef>
+          <a:fontRef idx="minor">
+            <a:schemeClr val="lt1"/>
+          </a:fontRef>
+        </p:style>
+        <p:txBody>
+          <a:bodyPr rtlCol="0" anchor="ctr"/>
+          <a:lstStyle/>
+          <a:p>
+            <a:pPr algn="ctr"/>
+            <a:endParaRPr lang="en-SG" sz="2400" dirty="0"/>
+          </a:p>
+        </p:txBody>
+      </p:sp>
+      <p:cxnSp>
+        <p:nvCxnSpPr>
+          <p:cNvPr id="23" name="Straight Connector 22">
+            <a:extLst>
+              <a:ext uri="{FF2B5EF4-FFF2-40B4-BE49-F238E27FC236}">
+                <a16:creationId xmlns:a16="http://schemas.microsoft.com/office/drawing/2014/main" id="{C561DA1D-6578-43E7-A5CA-934E3E5298F8}"/>
+              </a:ext>
+            </a:extLst>
+          </p:cNvPr>
+          <p:cNvCxnSpPr>
+            <a:cxnSpLocks/>
+          </p:cNvCxnSpPr>
+          <p:nvPr/>
+        </p:nvCxnSpPr>
+        <p:spPr>
+          <a:xfrm>
+            <a:off x="6491874" y="4058467"/>
+            <a:ext cx="0" cy="2647133"/>
+          </a:xfrm>
+          <a:prstGeom prst="line">
+            <a:avLst/>
+          </a:prstGeom>
+          <a:ln>
+            <a:solidFill>
+              <a:schemeClr val="accent2">
+                <a:lumMod val="75000"/>
+              </a:schemeClr>
+            </a:solidFill>
+            <a:prstDash val="dash"/>
+          </a:ln>
+        </p:spPr>
+        <p:style>
+          <a:lnRef idx="1">
+            <a:schemeClr val="accent1"/>
+          </a:lnRef>
+          <a:fillRef idx="0">
+            <a:schemeClr val="accent1"/>
+          </a:fillRef>
+          <a:effectRef idx="0">
+            <a:schemeClr val="accent1"/>
+          </a:effectRef>
+          <a:fontRef idx="minor">
+            <a:schemeClr val="tx1"/>
+          </a:fontRef>
+        </p:style>
+      </p:cxnSp>
+      <p:cxnSp>
+        <p:nvCxnSpPr>
+          <p:cNvPr id="28" name="Straight Connector 27">
+            <a:extLst>
+              <a:ext uri="{FF2B5EF4-FFF2-40B4-BE49-F238E27FC236}">
+                <a16:creationId xmlns:a16="http://schemas.microsoft.com/office/drawing/2014/main" id="{9D3C8F48-CADE-4DB4-872C-12577F611F7E}"/>
+              </a:ext>
+            </a:extLst>
+          </p:cNvPr>
+          <p:cNvCxnSpPr>
+            <a:cxnSpLocks/>
+            <a:endCxn id="38" idx="3"/>
+          </p:cNvCxnSpPr>
+          <p:nvPr/>
+        </p:nvCxnSpPr>
+        <p:spPr>
+          <a:xfrm flipH="1">
+            <a:off x="5360028" y="3838028"/>
+            <a:ext cx="1002710" cy="0"/>
+          </a:xfrm>
+          <a:prstGeom prst="line">
+            <a:avLst/>
+          </a:prstGeom>
+          <a:ln w="12700">
+            <a:solidFill>
+              <a:schemeClr val="accent2">
+                <a:lumMod val="75000"/>
+              </a:schemeClr>
+            </a:solidFill>
+            <a:prstDash val="solid"/>
+            <a:headEnd type="none" w="lg" len="lg"/>
+            <a:tailEnd type="triangle" w="med" len="med"/>
+          </a:ln>
+        </p:spPr>
+        <p:style>
+          <a:lnRef idx="1">
+            <a:schemeClr val="accent1"/>
+          </a:lnRef>
+          <a:fillRef idx="0">
+            <a:schemeClr val="accent1"/>
+          </a:fillRef>
+          <a:effectRef idx="0">
+            <a:schemeClr val="accent1"/>
+          </a:effectRef>
+          <a:fontRef idx="minor">
+            <a:schemeClr val="tx1"/>
+          </a:fontRef>
+        </p:style>
+      </p:cxnSp>
+      <p:cxnSp>
+        <p:nvCxnSpPr>
+          <p:cNvPr id="31" name="Straight Connector 30">
+            <a:extLst>
+              <a:ext uri="{FF2B5EF4-FFF2-40B4-BE49-F238E27FC236}">
+                <a16:creationId xmlns:a16="http://schemas.microsoft.com/office/drawing/2014/main" id="{A7F152A6-3B18-4624-B62F-3D10EC362066}"/>
+              </a:ext>
+            </a:extLst>
+          </p:cNvPr>
+          <p:cNvCxnSpPr>
+            <a:cxnSpLocks/>
+          </p:cNvCxnSpPr>
+          <p:nvPr/>
+        </p:nvCxnSpPr>
+        <p:spPr>
+          <a:xfrm>
+            <a:off x="2552700" y="5943600"/>
+            <a:ext cx="0" cy="914400"/>
+          </a:xfrm>
+          <a:prstGeom prst="line">
+            <a:avLst/>
+          </a:prstGeom>
+          <a:ln>
+            <a:prstDash val="dash"/>
+          </a:ln>
+        </p:spPr>
+        <p:style>
+          <a:lnRef idx="1">
+            <a:schemeClr val="accent1"/>
+          </a:lnRef>
+          <a:fillRef idx="0">
+            <a:schemeClr val="accent1"/>
+          </a:fillRef>
+          <a:effectRef idx="0">
+            <a:schemeClr val="accent1"/>
+          </a:effectRef>
+          <a:fontRef idx="minor">
+            <a:schemeClr val="tx1"/>
+          </a:fontRef>
+        </p:style>
+      </p:cxnSp>
+      <p:cxnSp>
+        <p:nvCxnSpPr>
+          <p:cNvPr id="33" name="Straight Connector 32">
+            <a:extLst>
+              <a:ext uri="{FF2B5EF4-FFF2-40B4-BE49-F238E27FC236}">
+                <a16:creationId xmlns:a16="http://schemas.microsoft.com/office/drawing/2014/main" id="{1255F66A-8D97-41EF-97CE-365F4D27954A}"/>
+              </a:ext>
+            </a:extLst>
+          </p:cNvPr>
+          <p:cNvCxnSpPr>
+            <a:cxnSpLocks/>
+          </p:cNvCxnSpPr>
+          <p:nvPr/>
+        </p:nvCxnSpPr>
+        <p:spPr>
+          <a:xfrm flipH="1">
+            <a:off x="619625" y="5943590"/>
+            <a:ext cx="1742570" cy="0"/>
+          </a:xfrm>
+          <a:prstGeom prst="line">
+            <a:avLst/>
+          </a:prstGeom>
+          <a:ln w="12700">
+            <a:solidFill>
+              <a:schemeClr val="accent1">
+                <a:lumMod val="75000"/>
+              </a:schemeClr>
+            </a:solidFill>
+            <a:prstDash val="dash"/>
+            <a:headEnd type="none" w="lg" len="lg"/>
+            <a:tailEnd type="triangle" w="med" len="med"/>
+          </a:ln>
+        </p:spPr>
+        <p:style>
+          <a:lnRef idx="1">
+            <a:schemeClr val="accent1"/>
+          </a:lnRef>
+          <a:fillRef idx="0">
+            <a:schemeClr val="accent1"/>
+          </a:fillRef>
+          <a:effectRef idx="0">
+            <a:schemeClr val="accent1"/>
+          </a:effectRef>
+          <a:fontRef idx="minor">
+            <a:schemeClr val="tx1"/>
+          </a:fontRef>
+        </p:style>
+      </p:cxnSp>
+      <p:sp>
+        <p:nvSpPr>
+          <p:cNvPr id="38" name="Rectangle 37">
+            <a:extLst>
+              <a:ext uri="{FF2B5EF4-FFF2-40B4-BE49-F238E27FC236}">
+                <a16:creationId xmlns:a16="http://schemas.microsoft.com/office/drawing/2014/main" id="{D9E837E8-000B-4452-A0BC-5ED341992854}"/>
+              </a:ext>
+            </a:extLst>
+          </p:cNvPr>
+          <p:cNvSpPr/>
+          <p:nvPr/>
+        </p:nvSpPr>
+        <p:spPr>
+          <a:xfrm>
+            <a:off x="2845428" y="3581400"/>
+            <a:ext cx="2514600" cy="513255"/>
+          </a:xfrm>
+          <a:prstGeom prst="rect">
+            <a:avLst/>
+          </a:prstGeom>
+          <a:solidFill>
+            <a:schemeClr val="bg2">
+              <a:lumMod val="50000"/>
+            </a:schemeClr>
+          </a:solidFill>
+          <a:ln>
+            <a:solidFill>
+              <a:schemeClr val="bg2">
+                <a:lumMod val="25000"/>
+              </a:schemeClr>
+            </a:solidFill>
+          </a:ln>
+        </p:spPr>
+        <p:style>
+          <a:lnRef idx="2">
+            <a:schemeClr val="accent1">
+              <a:shade val="50000"/>
+            </a:schemeClr>
+          </a:lnRef>
+          <a:fillRef idx="1">
+            <a:schemeClr val="accent1"/>
+          </a:fillRef>
+          <a:effectRef idx="0">
+            <a:schemeClr val="accent1"/>
+          </a:effectRef>
+          <a:fontRef idx="minor">
+            <a:schemeClr val="lt1"/>
+          </a:fontRef>
+        </p:style>
+        <p:txBody>
+          <a:bodyPr rtlCol="0" anchor="ctr"/>
+          <a:lstStyle/>
+          <a:p>
+            <a:pPr algn="ctr"/>
+            <a:r>
+              <a:rPr lang="en-SG" sz="2400" dirty="0"/>
+              <a:t>:</a:t>
+            </a:r>
+            <a:r>
+              <a:rPr lang="en-SG" sz="2400" dirty="0" err="1"/>
+              <a:t>CommandResult</a:t>
+            </a:r>
+            <a:endParaRPr lang="en-SG" sz="2400" dirty="0"/>
+          </a:p>
+        </p:txBody>
+      </p:sp>
+      <p:sp>
+        <p:nvSpPr>
+          <p:cNvPr id="39" name="Rectangle 38">
+            <a:extLst>
+              <a:ext uri="{FF2B5EF4-FFF2-40B4-BE49-F238E27FC236}">
+                <a16:creationId xmlns:a16="http://schemas.microsoft.com/office/drawing/2014/main" id="{4D5F4BCB-9D22-47C9-BE7C-A750193796A6}"/>
+              </a:ext>
+            </a:extLst>
+          </p:cNvPr>
+          <p:cNvSpPr/>
+          <p:nvPr/>
+        </p:nvSpPr>
+        <p:spPr>
+          <a:xfrm rot="5400000">
+            <a:off x="3759887" y="4228025"/>
+            <a:ext cx="533400" cy="266661"/>
+          </a:xfrm>
+          <a:prstGeom prst="rect">
+            <a:avLst/>
+          </a:prstGeom>
+          <a:noFill/>
+          <a:ln>
+            <a:solidFill>
+              <a:schemeClr val="bg2">
+                <a:lumMod val="50000"/>
+              </a:schemeClr>
+            </a:solidFill>
+          </a:ln>
+        </p:spPr>
+        <p:style>
+          <a:lnRef idx="2">
+            <a:schemeClr val="accent1">
+              <a:shade val="50000"/>
+            </a:schemeClr>
+          </a:lnRef>
+          <a:fillRef idx="1">
+            <a:schemeClr val="accent1"/>
+          </a:fillRef>
+          <a:effectRef idx="0">
+            <a:schemeClr val="accent1"/>
+          </a:effectRef>
+          <a:fontRef idx="minor">
+            <a:schemeClr val="lt1"/>
+          </a:fontRef>
+        </p:style>
+        <p:txBody>
+          <a:bodyPr rtlCol="0" anchor="ctr"/>
+          <a:lstStyle/>
+          <a:p>
+            <a:pPr algn="ctr"/>
+            <a:endParaRPr lang="en-SG" sz="2400" dirty="0"/>
+          </a:p>
+        </p:txBody>
+      </p:sp>
+      <p:cxnSp>
+        <p:nvCxnSpPr>
+          <p:cNvPr id="43" name="Straight Connector 42">
+            <a:extLst>
+              <a:ext uri="{FF2B5EF4-FFF2-40B4-BE49-F238E27FC236}">
+                <a16:creationId xmlns:a16="http://schemas.microsoft.com/office/drawing/2014/main" id="{F8A6541E-29CD-4B9A-8A18-51781A2FFB77}"/>
+              </a:ext>
+            </a:extLst>
+          </p:cNvPr>
+          <p:cNvCxnSpPr>
+            <a:cxnSpLocks/>
+          </p:cNvCxnSpPr>
+          <p:nvPr/>
+        </p:nvCxnSpPr>
+        <p:spPr>
+          <a:xfrm flipH="1">
+            <a:off x="2666959" y="4648200"/>
+            <a:ext cx="1226297" cy="0"/>
+          </a:xfrm>
+          <a:prstGeom prst="line">
+            <a:avLst/>
+          </a:prstGeom>
+          <a:ln w="12700">
+            <a:solidFill>
+              <a:schemeClr val="bg2">
+                <a:lumMod val="50000"/>
+              </a:schemeClr>
+            </a:solidFill>
+            <a:prstDash val="dash"/>
+            <a:headEnd type="none" w="lg" len="lg"/>
+            <a:tailEnd type="triangle" w="med" len="med"/>
+          </a:ln>
+        </p:spPr>
+        <p:style>
+          <a:lnRef idx="1">
+            <a:schemeClr val="accent1"/>
+          </a:lnRef>
+          <a:fillRef idx="0">
+            <a:schemeClr val="accent1"/>
+          </a:fillRef>
+          <a:effectRef idx="0">
+            <a:schemeClr val="accent1"/>
+          </a:effectRef>
+          <a:fontRef idx="minor">
+            <a:schemeClr val="tx1"/>
+          </a:fontRef>
+        </p:style>
+      </p:cxnSp>
+      <p:cxnSp>
+        <p:nvCxnSpPr>
+          <p:cNvPr id="46" name="Straight Connector 45">
+            <a:extLst>
+              <a:ext uri="{FF2B5EF4-FFF2-40B4-BE49-F238E27FC236}">
+                <a16:creationId xmlns:a16="http://schemas.microsoft.com/office/drawing/2014/main" id="{2735A044-8B6E-4095-B9CD-C6C38960D742}"/>
+              </a:ext>
+            </a:extLst>
+          </p:cNvPr>
+          <p:cNvCxnSpPr>
+            <a:cxnSpLocks/>
+          </p:cNvCxnSpPr>
+          <p:nvPr/>
+        </p:nvCxnSpPr>
+        <p:spPr>
+          <a:xfrm>
+            <a:off x="4038600" y="4640179"/>
+            <a:ext cx="0" cy="389021"/>
+          </a:xfrm>
+          <a:prstGeom prst="line">
+            <a:avLst/>
+          </a:prstGeom>
+          <a:ln>
+            <a:solidFill>
+              <a:schemeClr val="bg2">
+                <a:lumMod val="50000"/>
+              </a:schemeClr>
+            </a:solidFill>
+            <a:prstDash val="dash"/>
+          </a:ln>
+        </p:spPr>
+        <p:style>
+          <a:lnRef idx="1">
+            <a:schemeClr val="accent1"/>
+          </a:lnRef>
+          <a:fillRef idx="0">
+            <a:schemeClr val="accent1"/>
+          </a:fillRef>
+          <a:effectRef idx="0">
+            <a:schemeClr val="accent1"/>
+          </a:effectRef>
+          <a:fontRef idx="minor">
+            <a:schemeClr val="tx1"/>
+          </a:fontRef>
+        </p:style>
+      </p:cxnSp>
+      <p:sp>
+        <p:nvSpPr>
+          <p:cNvPr id="48" name="Rectangle 47">
+            <a:extLst>
+              <a:ext uri="{FF2B5EF4-FFF2-40B4-BE49-F238E27FC236}">
+                <a16:creationId xmlns:a16="http://schemas.microsoft.com/office/drawing/2014/main" id="{D4690FF0-3A65-4E50-8C6A-D15F932378B9}"/>
+              </a:ext>
+            </a:extLst>
+          </p:cNvPr>
+          <p:cNvSpPr/>
+          <p:nvPr/>
+        </p:nvSpPr>
+        <p:spPr>
+          <a:xfrm rot="5400000">
+            <a:off x="3759885" y="5174693"/>
+            <a:ext cx="533400" cy="266661"/>
+          </a:xfrm>
+          <a:prstGeom prst="rect">
+            <a:avLst/>
+          </a:prstGeom>
+          <a:noFill/>
+          <a:ln>
+            <a:solidFill>
+              <a:schemeClr val="bg2">
+                <a:lumMod val="50000"/>
+              </a:schemeClr>
+            </a:solidFill>
+          </a:ln>
+        </p:spPr>
+        <p:style>
+          <a:lnRef idx="2">
+            <a:schemeClr val="accent1">
+              <a:shade val="50000"/>
+            </a:schemeClr>
+          </a:lnRef>
+          <a:fillRef idx="1">
+            <a:schemeClr val="accent1"/>
+          </a:fillRef>
+          <a:effectRef idx="0">
+            <a:schemeClr val="accent1"/>
+          </a:effectRef>
+          <a:fontRef idx="minor">
+            <a:schemeClr val="lt1"/>
+          </a:fontRef>
+        </p:style>
+        <p:txBody>
+          <a:bodyPr rtlCol="0" anchor="ctr"/>
+          <a:lstStyle/>
+          <a:p>
+            <a:pPr algn="ctr"/>
+            <a:endParaRPr lang="en-SG" sz="2400" dirty="0"/>
+          </a:p>
+        </p:txBody>
+      </p:sp>
+      <p:cxnSp>
+        <p:nvCxnSpPr>
+          <p:cNvPr id="50" name="Straight Connector 49">
+            <a:extLst>
+              <a:ext uri="{FF2B5EF4-FFF2-40B4-BE49-F238E27FC236}">
+                <a16:creationId xmlns:a16="http://schemas.microsoft.com/office/drawing/2014/main" id="{44A8DC69-0FB2-4C04-B29A-606E50AD2041}"/>
+              </a:ext>
+            </a:extLst>
+          </p:cNvPr>
+          <p:cNvCxnSpPr>
+            <a:cxnSpLocks/>
+          </p:cNvCxnSpPr>
+          <p:nvPr/>
+        </p:nvCxnSpPr>
+        <p:spPr>
+          <a:xfrm flipH="1">
+            <a:off x="2666959" y="5574724"/>
+            <a:ext cx="1226297" cy="0"/>
+          </a:xfrm>
+          <a:prstGeom prst="line">
+            <a:avLst/>
+          </a:prstGeom>
+          <a:ln w="12700">
+            <a:solidFill>
+              <a:schemeClr val="bg2">
+                <a:lumMod val="50000"/>
+              </a:schemeClr>
+            </a:solidFill>
+            <a:prstDash val="dash"/>
+            <a:headEnd type="none" w="lg" len="lg"/>
+            <a:tailEnd type="triangle" w="med" len="med"/>
+          </a:ln>
+        </p:spPr>
+        <p:style>
+          <a:lnRef idx="1">
+            <a:schemeClr val="accent1"/>
+          </a:lnRef>
+          <a:fillRef idx="0">
+            <a:schemeClr val="accent1"/>
+          </a:fillRef>
+          <a:effectRef idx="0">
+            <a:schemeClr val="accent1"/>
+          </a:effectRef>
+          <a:fontRef idx="minor">
+            <a:schemeClr val="tx1"/>
+          </a:fontRef>
+        </p:style>
+      </p:cxnSp>
+      <p:sp>
+        <p:nvSpPr>
+          <p:cNvPr id="54" name="Rectangle 53">
+            <a:extLst>
+              <a:ext uri="{FF2B5EF4-FFF2-40B4-BE49-F238E27FC236}">
+                <a16:creationId xmlns:a16="http://schemas.microsoft.com/office/drawing/2014/main" id="{3FEF74CE-3FE1-4C7D-A441-1606AD52A086}"/>
+              </a:ext>
+            </a:extLst>
+          </p:cNvPr>
+          <p:cNvSpPr/>
+          <p:nvPr/>
+        </p:nvSpPr>
+        <p:spPr>
+          <a:xfrm>
+            <a:off x="1143000" y="4094654"/>
+            <a:ext cx="502318" cy="248746"/>
+          </a:xfrm>
+          <a:prstGeom prst="rect">
+            <a:avLst/>
+          </a:prstGeom>
+          <a:noFill/>
+          <a:ln w="3175">
+            <a:solidFill>
+              <a:schemeClr val="accent6"/>
+            </a:solidFill>
+          </a:ln>
+        </p:spPr>
+        <p:style>
+          <a:lnRef idx="2">
+            <a:schemeClr val="accent1">
+              <a:shade val="50000"/>
+            </a:schemeClr>
+          </a:lnRef>
+          <a:fillRef idx="1">
+            <a:schemeClr val="accent1"/>
+          </a:fillRef>
+          <a:effectRef idx="0">
+            <a:schemeClr val="accent1"/>
+          </a:effectRef>
+          <a:fontRef idx="minor">
+            <a:schemeClr val="lt1"/>
+          </a:fontRef>
+        </p:style>
+        <p:txBody>
+          <a:bodyPr rtlCol="0" anchor="ctr"/>
+          <a:lstStyle/>
+          <a:p>
+            <a:pPr algn="ctr"/>
+            <a:r>
+              <a:rPr lang="en-SG" dirty="0">
+                <a:solidFill>
+                  <a:schemeClr val="accent6"/>
+                </a:solidFill>
+              </a:rPr>
+              <a:t>alt</a:t>
+            </a:r>
+          </a:p>
+        </p:txBody>
+      </p:sp>
+      <p:sp>
+        <p:nvSpPr>
+          <p:cNvPr id="55" name="TextBox 54">
+            <a:extLst>
+              <a:ext uri="{FF2B5EF4-FFF2-40B4-BE49-F238E27FC236}">
+                <a16:creationId xmlns:a16="http://schemas.microsoft.com/office/drawing/2014/main" id="{98BD03FD-7D5F-4804-A5C7-9747B4308FD1}"/>
+              </a:ext>
+            </a:extLst>
+          </p:cNvPr>
+          <p:cNvSpPr txBox="1"/>
+          <p:nvPr/>
+        </p:nvSpPr>
+        <p:spPr>
+          <a:xfrm>
+            <a:off x="4336243" y="4416623"/>
+            <a:ext cx="1619248" cy="307777"/>
+          </a:xfrm>
+          <a:prstGeom prst="rect">
+            <a:avLst/>
+          </a:prstGeom>
+          <a:noFill/>
+          <a:ln>
+            <a:noFill/>
+          </a:ln>
+        </p:spPr>
+        <p:txBody>
+          <a:bodyPr wrap="square" rtlCol="0">
+            <a:spAutoFit/>
+          </a:bodyPr>
+          <a:lstStyle/>
+          <a:p>
+            <a:r>
+              <a:rPr lang="en-SG" sz="1400" dirty="0">
+                <a:solidFill>
+                  <a:schemeClr val="accent6"/>
+                </a:solidFill>
+              </a:rPr>
+              <a:t>MESSAGE_SUCCESS</a:t>
+            </a:r>
+          </a:p>
+        </p:txBody>
+      </p:sp>
+      <p:sp>
+        <p:nvSpPr>
+          <p:cNvPr id="56" name="TextBox 55">
+            <a:extLst>
+              <a:ext uri="{FF2B5EF4-FFF2-40B4-BE49-F238E27FC236}">
+                <a16:creationId xmlns:a16="http://schemas.microsoft.com/office/drawing/2014/main" id="{645696D8-75AA-4EFD-A120-FF194A3CCFD6}"/>
+              </a:ext>
+            </a:extLst>
+          </p:cNvPr>
+          <p:cNvSpPr txBox="1"/>
+          <p:nvPr/>
+        </p:nvSpPr>
+        <p:spPr>
+          <a:xfrm>
+            <a:off x="4146867" y="5209401"/>
+            <a:ext cx="2330133" cy="276999"/>
+          </a:xfrm>
+          <a:prstGeom prst="rect">
+            <a:avLst/>
+          </a:prstGeom>
+          <a:noFill/>
+          <a:ln>
+            <a:noFill/>
+          </a:ln>
+        </p:spPr>
+        <p:txBody>
+          <a:bodyPr wrap="square" rtlCol="0">
+            <a:spAutoFit/>
+          </a:bodyPr>
+          <a:lstStyle/>
+          <a:p>
+            <a:r>
+              <a:rPr lang="en-SG" sz="1200" dirty="0">
+                <a:solidFill>
+                  <a:schemeClr val="accent6"/>
+                </a:solidFill>
+              </a:rPr>
+              <a:t>MESSAGE_DUPLICATE_PERSON</a:t>
+            </a:r>
+          </a:p>
+        </p:txBody>
+      </p:sp>
+      <p:cxnSp>
+        <p:nvCxnSpPr>
+          <p:cNvPr id="60" name="Straight Connector 59">
+            <a:extLst>
+              <a:ext uri="{FF2B5EF4-FFF2-40B4-BE49-F238E27FC236}">
+                <a16:creationId xmlns:a16="http://schemas.microsoft.com/office/drawing/2014/main" id="{873151E9-DE28-442C-B14B-C317A560BB42}"/>
+              </a:ext>
+            </a:extLst>
+          </p:cNvPr>
+          <p:cNvCxnSpPr>
+            <a:cxnSpLocks/>
+          </p:cNvCxnSpPr>
+          <p:nvPr/>
+        </p:nvCxnSpPr>
+        <p:spPr>
+          <a:xfrm>
+            <a:off x="6504842" y="2919572"/>
+            <a:ext cx="758" cy="661828"/>
+          </a:xfrm>
+          <a:prstGeom prst="line">
+            <a:avLst/>
+          </a:prstGeom>
+          <a:ln>
+            <a:solidFill>
+              <a:schemeClr val="accent2">
+                <a:lumMod val="75000"/>
+              </a:schemeClr>
+            </a:solidFill>
+            <a:prstDash val="dash"/>
+          </a:ln>
+        </p:spPr>
+        <p:style>
+          <a:lnRef idx="1">
+            <a:schemeClr val="accent1"/>
+          </a:lnRef>
+          <a:fillRef idx="0">
+            <a:schemeClr val="accent1"/>
+          </a:fillRef>
+          <a:effectRef idx="0">
+            <a:schemeClr val="accent1"/>
+          </a:effectRef>
+          <a:fontRef idx="minor">
+            <a:schemeClr val="tx1"/>
+          </a:fontRef>
+        </p:style>
+      </p:cxnSp>
+      <p:sp>
+        <p:nvSpPr>
+          <p:cNvPr id="62" name="Rectangle 61">
+            <a:extLst>
+              <a:ext uri="{FF2B5EF4-FFF2-40B4-BE49-F238E27FC236}">
+                <a16:creationId xmlns:a16="http://schemas.microsoft.com/office/drawing/2014/main" id="{4CC6EE85-A3C5-451F-BED0-BD785E6CE753}"/>
+              </a:ext>
+            </a:extLst>
+          </p:cNvPr>
+          <p:cNvSpPr/>
+          <p:nvPr/>
+        </p:nvSpPr>
+        <p:spPr>
+          <a:xfrm rot="5400000">
+            <a:off x="6253451" y="3686640"/>
+            <a:ext cx="485229" cy="266662"/>
+          </a:xfrm>
+          <a:prstGeom prst="rect">
+            <a:avLst/>
+          </a:prstGeom>
+          <a:noFill/>
+          <a:ln>
+            <a:solidFill>
+              <a:schemeClr val="accent2">
+                <a:lumMod val="75000"/>
+              </a:schemeClr>
+            </a:solidFill>
+          </a:ln>
+        </p:spPr>
+        <p:style>
+          <a:lnRef idx="2">
+            <a:schemeClr val="accent1">
+              <a:shade val="50000"/>
+            </a:schemeClr>
+          </a:lnRef>
+          <a:fillRef idx="1">
+            <a:schemeClr val="accent1"/>
+          </a:fillRef>
+          <a:effectRef idx="0">
+            <a:schemeClr val="accent1"/>
+          </a:effectRef>
+          <a:fontRef idx="minor">
+            <a:schemeClr val="lt1"/>
+          </a:fontRef>
+        </p:style>
+        <p:txBody>
+          <a:bodyPr rtlCol="0" anchor="ctr"/>
+          <a:lstStyle/>
+          <a:p>
+            <a:pPr algn="ctr"/>
+            <a:endParaRPr lang="en-SG" sz="2400" dirty="0"/>
+          </a:p>
+        </p:txBody>
+      </p:sp>
+      <p:cxnSp>
+        <p:nvCxnSpPr>
+          <p:cNvPr id="66" name="Straight Connector 65">
+            <a:extLst>
+              <a:ext uri="{FF2B5EF4-FFF2-40B4-BE49-F238E27FC236}">
+                <a16:creationId xmlns:a16="http://schemas.microsoft.com/office/drawing/2014/main" id="{A2AE2DA1-D983-4062-8C9F-27ECA730596B}"/>
+              </a:ext>
+            </a:extLst>
+          </p:cNvPr>
+          <p:cNvCxnSpPr>
+            <a:cxnSpLocks/>
+          </p:cNvCxnSpPr>
+          <p:nvPr/>
+        </p:nvCxnSpPr>
+        <p:spPr>
+          <a:xfrm flipH="1">
+            <a:off x="2666959" y="2919572"/>
+            <a:ext cx="3705815" cy="0"/>
+          </a:xfrm>
+          <a:prstGeom prst="line">
+            <a:avLst/>
+          </a:prstGeom>
+          <a:ln w="12700">
+            <a:solidFill>
+              <a:schemeClr val="accent2">
+                <a:lumMod val="75000"/>
+              </a:schemeClr>
+            </a:solidFill>
+            <a:prstDash val="dash"/>
+            <a:headEnd type="none" w="lg" len="lg"/>
+            <a:tailEnd type="triangle" w="med" len="med"/>
+          </a:ln>
+        </p:spPr>
+        <p:style>
+          <a:lnRef idx="1">
+            <a:schemeClr val="accent1"/>
+          </a:lnRef>
+          <a:fillRef idx="0">
+            <a:schemeClr val="accent1"/>
+          </a:fillRef>
+          <a:effectRef idx="0">
+            <a:schemeClr val="accent1"/>
+          </a:effectRef>
+          <a:fontRef idx="minor">
+            <a:schemeClr val="tx1"/>
+          </a:fontRef>
+        </p:style>
+      </p:cxnSp>
+      <p:sp>
+        <p:nvSpPr>
+          <p:cNvPr id="32" name="TextBox 31">
+            <a:extLst>
+              <a:ext uri="{FF2B5EF4-FFF2-40B4-BE49-F238E27FC236}">
+                <a16:creationId xmlns:a16="http://schemas.microsoft.com/office/drawing/2014/main" id="{3BDB4BEE-3929-49C9-AF6F-E3CE8A15BAA9}"/>
+              </a:ext>
+            </a:extLst>
+          </p:cNvPr>
+          <p:cNvSpPr txBox="1"/>
+          <p:nvPr/>
+        </p:nvSpPr>
+        <p:spPr>
+          <a:xfrm>
+            <a:off x="4958847" y="4169489"/>
+            <a:ext cx="497798" cy="307777"/>
+          </a:xfrm>
+          <a:prstGeom prst="rect">
+            <a:avLst/>
+          </a:prstGeom>
+          <a:noFill/>
+          <a:ln>
+            <a:noFill/>
+          </a:ln>
+        </p:spPr>
+        <p:txBody>
+          <a:bodyPr wrap="square" rtlCol="0">
+            <a:spAutoFit/>
+          </a:bodyPr>
+          <a:lstStyle/>
+          <a:p>
+            <a:r>
+              <a:rPr lang="en-SG" sz="1400" dirty="0">
+                <a:solidFill>
+                  <a:schemeClr val="accent6"/>
+                </a:solidFill>
+              </a:rPr>
+              <a:t>[if]</a:t>
+            </a:r>
+          </a:p>
+        </p:txBody>
+      </p:sp>
+      <p:sp>
+        <p:nvSpPr>
+          <p:cNvPr id="34" name="TextBox 33">
+            <a:extLst>
+              <a:ext uri="{FF2B5EF4-FFF2-40B4-BE49-F238E27FC236}">
+                <a16:creationId xmlns:a16="http://schemas.microsoft.com/office/drawing/2014/main" id="{8B99150D-0796-458A-B147-80CB097D24B1}"/>
+              </a:ext>
+            </a:extLst>
+          </p:cNvPr>
+          <p:cNvSpPr txBox="1"/>
+          <p:nvPr/>
+        </p:nvSpPr>
+        <p:spPr>
+          <a:xfrm>
+            <a:off x="4864579" y="4940752"/>
+            <a:ext cx="657211" cy="307777"/>
+          </a:xfrm>
+          <a:prstGeom prst="rect">
+            <a:avLst/>
+          </a:prstGeom>
+          <a:noFill/>
+          <a:ln>
+            <a:noFill/>
+          </a:ln>
+        </p:spPr>
+        <p:txBody>
+          <a:bodyPr wrap="square" rtlCol="0">
+            <a:spAutoFit/>
+          </a:bodyPr>
+          <a:lstStyle/>
+          <a:p>
+            <a:r>
+              <a:rPr lang="en-SG" sz="1400" dirty="0">
+                <a:solidFill>
+                  <a:schemeClr val="accent6"/>
+                </a:solidFill>
+              </a:rPr>
+              <a:t>[else]</a:t>
+            </a:r>
+          </a:p>
+        </p:txBody>
+      </p:sp>
+    </p:spTree>
+    <p:extLst>
+      <p:ext uri="{BB962C8B-B14F-4D97-AF65-F5344CB8AC3E}">
+        <p14:creationId xmlns:p14="http://schemas.microsoft.com/office/powerpoint/2010/main" val="1286940736"/>
       </p:ext>
     </p:extLst>
   </p:cSld>

</xml_diff>